<commit_message>
added the transfer diagram for the carrier model
</commit_message>
<xml_diff>
--- a/diagrams/carriers.pptx
+++ b/diagrams/carriers.pptx
@@ -5,8 +5,8 @@
     <p:sldMasterId id="2147483672" r:id="rId1"/>
   </p:sldMasterIdLst>
   <p:sldIdLst>
-    <p:sldId id="256" r:id="rId2"/>
-    <p:sldId id="257" r:id="rId3"/>
+    <p:sldId id="257" r:id="rId2"/>
+    <p:sldId id="256" r:id="rId3"/>
   </p:sldIdLst>
   <p:sldSz cx="9720263" cy="3600450"/>
   <p:notesSz cx="6858000" cy="9144000"/>
@@ -117,8 +117,8 @@
 <pc:chgInfo xmlns:a="http://schemas.openxmlformats.org/drawingml/2006/main" xmlns:r="http://schemas.openxmlformats.org/officeDocument/2006/relationships" xmlns:ac="http://schemas.microsoft.com/office/drawing/2013/main/command" xmlns:pc="http://schemas.microsoft.com/office/powerpoint/2013/main/command">
   <pc:docChgLst>
     <pc:chgData name="Chen, David" userId="ca743ca0-a026-471f-bfdf-cc601ae2aa9d" providerId="ADAL" clId="{B1C339AF-FBCF-455F-913D-87FC7FD0797C}"/>
-    <pc:docChg chg="undo custSel addSld delSld modSld">
-      <pc:chgData name="Chen, David" userId="ca743ca0-a026-471f-bfdf-cc601ae2aa9d" providerId="ADAL" clId="{B1C339AF-FBCF-455F-913D-87FC7FD0797C}" dt="2023-03-23T00:55:50.791" v="65" actId="114"/>
+    <pc:docChg chg="undo custSel addSld delSld modSld sldOrd">
+      <pc:chgData name="Chen, David" userId="ca743ca0-a026-471f-bfdf-cc601ae2aa9d" providerId="ADAL" clId="{B1C339AF-FBCF-455F-913D-87FC7FD0797C}" dt="2023-03-28T16:02:55.064" v="68" actId="1076"/>
       <pc:docMkLst>
         <pc:docMk/>
       </pc:docMkLst>
@@ -224,14 +224,14 @@
           <pc:sldMk cId="3406864433" sldId="257"/>
         </pc:sldMkLst>
       </pc:sldChg>
-      <pc:sldChg chg="addSp modSp add mod">
-        <pc:chgData name="Chen, David" userId="ca743ca0-a026-471f-bfdf-cc601ae2aa9d" providerId="ADAL" clId="{B1C339AF-FBCF-455F-913D-87FC7FD0797C}" dt="2023-03-23T00:55:50.791" v="65" actId="114"/>
+      <pc:sldChg chg="addSp modSp add mod ord">
+        <pc:chgData name="Chen, David" userId="ca743ca0-a026-471f-bfdf-cc601ae2aa9d" providerId="ADAL" clId="{B1C339AF-FBCF-455F-913D-87FC7FD0797C}" dt="2023-03-28T16:02:55.064" v="68" actId="1076"/>
         <pc:sldMkLst>
           <pc:docMk/>
           <pc:sldMk cId="4257385499" sldId="257"/>
         </pc:sldMkLst>
         <pc:spChg chg="add mod ord">
-          <ac:chgData name="Chen, David" userId="ca743ca0-a026-471f-bfdf-cc601ae2aa9d" providerId="ADAL" clId="{B1C339AF-FBCF-455F-913D-87FC7FD0797C}" dt="2023-03-23T00:55:10.989" v="43" actId="208"/>
+          <ac:chgData name="Chen, David" userId="ca743ca0-a026-471f-bfdf-cc601ae2aa9d" providerId="ADAL" clId="{B1C339AF-FBCF-455F-913D-87FC7FD0797C}" dt="2023-03-28T16:02:55.064" v="68" actId="1076"/>
           <ac:spMkLst>
             <pc:docMk/>
             <pc:sldMk cId="4257385499" sldId="257"/>
@@ -510,7 +510,7 @@
           <a:p>
             <a:fld id="{12DA9635-0A8E-4320-BFD1-7C1D2F7CB404}" type="datetimeFigureOut">
               <a:rPr lang="nl-NL" smtClean="0"/>
-              <a:t>23-3-2023</a:t>
+              <a:t>28-3-2023</a:t>
             </a:fld>
             <a:endParaRPr lang="nl-NL"/>
           </a:p>
@@ -680,7 +680,7 @@
           <a:p>
             <a:fld id="{12DA9635-0A8E-4320-BFD1-7C1D2F7CB404}" type="datetimeFigureOut">
               <a:rPr lang="nl-NL" smtClean="0"/>
-              <a:t>23-3-2023</a:t>
+              <a:t>28-3-2023</a:t>
             </a:fld>
             <a:endParaRPr lang="nl-NL"/>
           </a:p>
@@ -860,7 +860,7 @@
           <a:p>
             <a:fld id="{12DA9635-0A8E-4320-BFD1-7C1D2F7CB404}" type="datetimeFigureOut">
               <a:rPr lang="nl-NL" smtClean="0"/>
-              <a:t>23-3-2023</a:t>
+              <a:t>28-3-2023</a:t>
             </a:fld>
             <a:endParaRPr lang="nl-NL"/>
           </a:p>
@@ -1030,7 +1030,7 @@
           <a:p>
             <a:fld id="{12DA9635-0A8E-4320-BFD1-7C1D2F7CB404}" type="datetimeFigureOut">
               <a:rPr lang="nl-NL" smtClean="0"/>
-              <a:t>23-3-2023</a:t>
+              <a:t>28-3-2023</a:t>
             </a:fld>
             <a:endParaRPr lang="nl-NL"/>
           </a:p>
@@ -1276,7 +1276,7 @@
           <a:p>
             <a:fld id="{12DA9635-0A8E-4320-BFD1-7C1D2F7CB404}" type="datetimeFigureOut">
               <a:rPr lang="nl-NL" smtClean="0"/>
-              <a:t>23-3-2023</a:t>
+              <a:t>28-3-2023</a:t>
             </a:fld>
             <a:endParaRPr lang="nl-NL"/>
           </a:p>
@@ -1508,7 +1508,7 @@
           <a:p>
             <a:fld id="{12DA9635-0A8E-4320-BFD1-7C1D2F7CB404}" type="datetimeFigureOut">
               <a:rPr lang="nl-NL" smtClean="0"/>
-              <a:t>23-3-2023</a:t>
+              <a:t>28-3-2023</a:t>
             </a:fld>
             <a:endParaRPr lang="nl-NL"/>
           </a:p>
@@ -1875,7 +1875,7 @@
           <a:p>
             <a:fld id="{12DA9635-0A8E-4320-BFD1-7C1D2F7CB404}" type="datetimeFigureOut">
               <a:rPr lang="nl-NL" smtClean="0"/>
-              <a:t>23-3-2023</a:t>
+              <a:t>28-3-2023</a:t>
             </a:fld>
             <a:endParaRPr lang="nl-NL"/>
           </a:p>
@@ -1993,7 +1993,7 @@
           <a:p>
             <a:fld id="{12DA9635-0A8E-4320-BFD1-7C1D2F7CB404}" type="datetimeFigureOut">
               <a:rPr lang="nl-NL" smtClean="0"/>
-              <a:t>23-3-2023</a:t>
+              <a:t>28-3-2023</a:t>
             </a:fld>
             <a:endParaRPr lang="nl-NL"/>
           </a:p>
@@ -2088,7 +2088,7 @@
           <a:p>
             <a:fld id="{12DA9635-0A8E-4320-BFD1-7C1D2F7CB404}" type="datetimeFigureOut">
               <a:rPr lang="nl-NL" smtClean="0"/>
-              <a:t>23-3-2023</a:t>
+              <a:t>28-3-2023</a:t>
             </a:fld>
             <a:endParaRPr lang="nl-NL"/>
           </a:p>
@@ -2365,7 +2365,7 @@
           <a:p>
             <a:fld id="{12DA9635-0A8E-4320-BFD1-7C1D2F7CB404}" type="datetimeFigureOut">
               <a:rPr lang="nl-NL" smtClean="0"/>
-              <a:t>23-3-2023</a:t>
+              <a:t>28-3-2023</a:t>
             </a:fld>
             <a:endParaRPr lang="nl-NL"/>
           </a:p>
@@ -2622,7 +2622,7 @@
           <a:p>
             <a:fld id="{12DA9635-0A8E-4320-BFD1-7C1D2F7CB404}" type="datetimeFigureOut">
               <a:rPr lang="nl-NL" smtClean="0"/>
-              <a:t>23-3-2023</a:t>
+              <a:t>28-3-2023</a:t>
             </a:fld>
             <a:endParaRPr lang="nl-NL"/>
           </a:p>
@@ -2835,7 +2835,7 @@
           <a:p>
             <a:fld id="{12DA9635-0A8E-4320-BFD1-7C1D2F7CB404}" type="datetimeFigureOut">
               <a:rPr lang="nl-NL" smtClean="0"/>
-              <a:t>23-3-2023</a:t>
+              <a:t>28-3-2023</a:t>
             </a:fld>
             <a:endParaRPr lang="nl-NL"/>
           </a:p>
@@ -3242,400 +3242,6 @@
       </p:grpSpPr>
       <p:sp>
         <p:nvSpPr>
-          <p:cNvPr id="7" name="TextBox 6">
-            <a:extLst>
-              <a:ext uri="{FF2B5EF4-FFF2-40B4-BE49-F238E27FC236}">
-                <a16:creationId xmlns:a16="http://schemas.microsoft.com/office/drawing/2014/main" id="{831BEC39-EFB7-F18A-9DFB-6BFD744ACE69}"/>
-              </a:ext>
-            </a:extLst>
-          </p:cNvPr>
-          <p:cNvSpPr txBox="1"/>
-          <p:nvPr/>
-        </p:nvSpPr>
-        <p:spPr>
-          <a:xfrm>
-            <a:off x="3923727" y="1778464"/>
-            <a:ext cx="2160000" cy="584775"/>
-          </a:xfrm>
-          <a:prstGeom prst="rect">
-            <a:avLst/>
-          </a:prstGeom>
-          <a:solidFill>
-            <a:schemeClr val="accent2">
-              <a:lumMod val="60000"/>
-              <a:lumOff val="40000"/>
-            </a:schemeClr>
-          </a:solidFill>
-        </p:spPr>
-        <p:txBody>
-          <a:bodyPr wrap="square" rtlCol="0">
-            <a:spAutoFit/>
-          </a:bodyPr>
-          <a:lstStyle/>
-          <a:p>
-            <a:pPr algn="ctr"/>
-            <a:r>
-              <a:rPr lang="en-US" sz="3200" dirty="0"/>
-              <a:t>Infected</a:t>
-            </a:r>
-            <a:endParaRPr lang="nl-NL" sz="3200" dirty="0"/>
-          </a:p>
-        </p:txBody>
-      </p:sp>
-      <p:sp>
-        <p:nvSpPr>
-          <p:cNvPr id="8" name="TextBox 7">
-            <a:extLst>
-              <a:ext uri="{FF2B5EF4-FFF2-40B4-BE49-F238E27FC236}">
-                <a16:creationId xmlns:a16="http://schemas.microsoft.com/office/drawing/2014/main" id="{5CD33D62-78AA-60FC-8767-F6816D1DB9EA}"/>
-              </a:ext>
-            </a:extLst>
-          </p:cNvPr>
-          <p:cNvSpPr txBox="1"/>
-          <p:nvPr/>
-        </p:nvSpPr>
-        <p:spPr>
-          <a:xfrm>
-            <a:off x="6810861" y="1246100"/>
-            <a:ext cx="2160000" cy="584775"/>
-          </a:xfrm>
-          <a:prstGeom prst="rect">
-            <a:avLst/>
-          </a:prstGeom>
-          <a:solidFill>
-            <a:schemeClr val="accent5">
-              <a:lumMod val="60000"/>
-              <a:lumOff val="40000"/>
-            </a:schemeClr>
-          </a:solidFill>
-        </p:spPr>
-        <p:txBody>
-          <a:bodyPr wrap="square" rtlCol="0">
-            <a:spAutoFit/>
-          </a:bodyPr>
-          <a:lstStyle/>
-          <a:p>
-            <a:pPr algn="ctr"/>
-            <a:r>
-              <a:rPr lang="en-US" sz="3200" dirty="0"/>
-              <a:t>Recovered</a:t>
-            </a:r>
-            <a:endParaRPr lang="nl-NL" sz="3200" dirty="0"/>
-          </a:p>
-        </p:txBody>
-      </p:sp>
-      <p:sp>
-        <p:nvSpPr>
-          <p:cNvPr id="2" name="TextBox 1">
-            <a:extLst>
-              <a:ext uri="{FF2B5EF4-FFF2-40B4-BE49-F238E27FC236}">
-                <a16:creationId xmlns:a16="http://schemas.microsoft.com/office/drawing/2014/main" id="{84049DDF-1B8C-90EE-6B57-F00E45097D9C}"/>
-              </a:ext>
-            </a:extLst>
-          </p:cNvPr>
-          <p:cNvSpPr txBox="1"/>
-          <p:nvPr/>
-        </p:nvSpPr>
-        <p:spPr>
-          <a:xfrm>
-            <a:off x="676593" y="1241074"/>
-            <a:ext cx="2520000" cy="584775"/>
-          </a:xfrm>
-          <a:prstGeom prst="rect">
-            <a:avLst/>
-          </a:prstGeom>
-          <a:solidFill>
-            <a:schemeClr val="accent4">
-              <a:lumMod val="40000"/>
-              <a:lumOff val="60000"/>
-            </a:schemeClr>
-          </a:solidFill>
-        </p:spPr>
-        <p:txBody>
-          <a:bodyPr wrap="square" rtlCol="0">
-            <a:spAutoFit/>
-          </a:bodyPr>
-          <a:lstStyle/>
-          <a:p>
-            <a:pPr algn="ctr"/>
-            <a:r>
-              <a:rPr lang="en-US" sz="3200" dirty="0"/>
-              <a:t>Susceptible</a:t>
-            </a:r>
-            <a:endParaRPr lang="nl-NL" sz="3200" dirty="0"/>
-          </a:p>
-        </p:txBody>
-      </p:sp>
-      <p:sp>
-        <p:nvSpPr>
-          <p:cNvPr id="16" name="Arrow: Right 15">
-            <a:extLst>
-              <a:ext uri="{FF2B5EF4-FFF2-40B4-BE49-F238E27FC236}">
-                <a16:creationId xmlns:a16="http://schemas.microsoft.com/office/drawing/2014/main" id="{3BCBB52A-0839-B95A-4F5C-4F16E2B3699B}"/>
-              </a:ext>
-            </a:extLst>
-          </p:cNvPr>
-          <p:cNvSpPr/>
-          <p:nvPr/>
-        </p:nvSpPr>
-        <p:spPr>
-          <a:xfrm rot="19500000">
-            <a:off x="3121027" y="1073641"/>
-            <a:ext cx="864000" cy="252000"/>
-          </a:xfrm>
-          <a:prstGeom prst="rightArrow">
-            <a:avLst>
-              <a:gd name="adj1" fmla="val 26963"/>
-              <a:gd name="adj2" fmla="val 50000"/>
-            </a:avLst>
-          </a:prstGeom>
-        </p:spPr>
-        <p:style>
-          <a:lnRef idx="2">
-            <a:schemeClr val="dk1">
-              <a:shade val="50000"/>
-            </a:schemeClr>
-          </a:lnRef>
-          <a:fillRef idx="1">
-            <a:schemeClr val="dk1"/>
-          </a:fillRef>
-          <a:effectRef idx="0">
-            <a:schemeClr val="dk1"/>
-          </a:effectRef>
-          <a:fontRef idx="minor">
-            <a:schemeClr val="lt1"/>
-          </a:fontRef>
-        </p:style>
-        <p:txBody>
-          <a:bodyPr rtlCol="0" anchor="ctr"/>
-          <a:lstStyle/>
-          <a:p>
-            <a:pPr algn="ctr"/>
-            <a:endParaRPr lang="nl-NL" dirty="0"/>
-          </a:p>
-        </p:txBody>
-      </p:sp>
-      <p:sp>
-        <p:nvSpPr>
-          <p:cNvPr id="18" name="Arrow: Right 17">
-            <a:extLst>
-              <a:ext uri="{FF2B5EF4-FFF2-40B4-BE49-F238E27FC236}">
-                <a16:creationId xmlns:a16="http://schemas.microsoft.com/office/drawing/2014/main" id="{619890EB-2F61-CC3F-D531-F271AC5C6DEE}"/>
-              </a:ext>
-            </a:extLst>
-          </p:cNvPr>
-          <p:cNvSpPr/>
-          <p:nvPr/>
-        </p:nvSpPr>
-        <p:spPr>
-          <a:xfrm rot="2100000" flipV="1">
-            <a:off x="3133510" y="1711077"/>
-            <a:ext cx="864000" cy="252000"/>
-          </a:xfrm>
-          <a:prstGeom prst="rightArrow">
-            <a:avLst>
-              <a:gd name="adj1" fmla="val 26963"/>
-              <a:gd name="adj2" fmla="val 50000"/>
-            </a:avLst>
-          </a:prstGeom>
-        </p:spPr>
-        <p:style>
-          <a:lnRef idx="2">
-            <a:schemeClr val="dk1">
-              <a:shade val="50000"/>
-            </a:schemeClr>
-          </a:lnRef>
-          <a:fillRef idx="1">
-            <a:schemeClr val="dk1"/>
-          </a:fillRef>
-          <a:effectRef idx="0">
-            <a:schemeClr val="dk1"/>
-          </a:effectRef>
-          <a:fontRef idx="minor">
-            <a:schemeClr val="lt1"/>
-          </a:fontRef>
-        </p:style>
-        <p:txBody>
-          <a:bodyPr rtlCol="0" anchor="ctr"/>
-          <a:lstStyle/>
-          <a:p>
-            <a:pPr algn="ctr"/>
-            <a:endParaRPr lang="nl-NL" dirty="0"/>
-          </a:p>
-        </p:txBody>
-      </p:sp>
-      <p:sp>
-        <p:nvSpPr>
-          <p:cNvPr id="4" name="TextBox 3">
-            <a:extLst>
-              <a:ext uri="{FF2B5EF4-FFF2-40B4-BE49-F238E27FC236}">
-                <a16:creationId xmlns:a16="http://schemas.microsoft.com/office/drawing/2014/main" id="{8657E4FA-809C-DD70-B2C2-7A29250E4FC7}"/>
-              </a:ext>
-            </a:extLst>
-          </p:cNvPr>
-          <p:cNvSpPr txBox="1"/>
-          <p:nvPr/>
-        </p:nvSpPr>
-        <p:spPr>
-          <a:xfrm>
-            <a:off x="3923727" y="656299"/>
-            <a:ext cx="2160000" cy="584775"/>
-          </a:xfrm>
-          <a:prstGeom prst="rect">
-            <a:avLst/>
-          </a:prstGeom>
-          <a:solidFill>
-            <a:schemeClr val="accent2">
-              <a:lumMod val="60000"/>
-              <a:lumOff val="40000"/>
-            </a:schemeClr>
-          </a:solidFill>
-        </p:spPr>
-        <p:txBody>
-          <a:bodyPr wrap="square" rtlCol="0">
-            <a:spAutoFit/>
-          </a:bodyPr>
-          <a:lstStyle/>
-          <a:p>
-            <a:pPr algn="ctr"/>
-            <a:r>
-              <a:rPr lang="en-US" sz="3200" dirty="0"/>
-              <a:t>Carrier</a:t>
-            </a:r>
-            <a:endParaRPr lang="nl-NL" sz="3200" dirty="0"/>
-          </a:p>
-        </p:txBody>
-      </p:sp>
-      <p:sp>
-        <p:nvSpPr>
-          <p:cNvPr id="15" name="Arrow: Right 14">
-            <a:extLst>
-              <a:ext uri="{FF2B5EF4-FFF2-40B4-BE49-F238E27FC236}">
-                <a16:creationId xmlns:a16="http://schemas.microsoft.com/office/drawing/2014/main" id="{A25E6295-2E58-04E7-07F7-64345810DA1B}"/>
-              </a:ext>
-            </a:extLst>
-          </p:cNvPr>
-          <p:cNvSpPr/>
-          <p:nvPr/>
-        </p:nvSpPr>
-        <p:spPr>
-          <a:xfrm rot="2100000" flipV="1">
-            <a:off x="6022425" y="1058976"/>
-            <a:ext cx="864000" cy="252000"/>
-          </a:xfrm>
-          <a:prstGeom prst="rightArrow">
-            <a:avLst>
-              <a:gd name="adj1" fmla="val 26963"/>
-              <a:gd name="adj2" fmla="val 50000"/>
-            </a:avLst>
-          </a:prstGeom>
-        </p:spPr>
-        <p:style>
-          <a:lnRef idx="2">
-            <a:schemeClr val="dk1">
-              <a:shade val="50000"/>
-            </a:schemeClr>
-          </a:lnRef>
-          <a:fillRef idx="1">
-            <a:schemeClr val="dk1"/>
-          </a:fillRef>
-          <a:effectRef idx="0">
-            <a:schemeClr val="dk1"/>
-          </a:effectRef>
-          <a:fontRef idx="minor">
-            <a:schemeClr val="lt1"/>
-          </a:fontRef>
-        </p:style>
-        <p:txBody>
-          <a:bodyPr rtlCol="0" anchor="ctr"/>
-          <a:lstStyle/>
-          <a:p>
-            <a:pPr algn="ctr"/>
-            <a:endParaRPr lang="nl-NL" dirty="0"/>
-          </a:p>
-        </p:txBody>
-      </p:sp>
-      <p:sp>
-        <p:nvSpPr>
-          <p:cNvPr id="17" name="Arrow: Right 16">
-            <a:extLst>
-              <a:ext uri="{FF2B5EF4-FFF2-40B4-BE49-F238E27FC236}">
-                <a16:creationId xmlns:a16="http://schemas.microsoft.com/office/drawing/2014/main" id="{ECBAAB4E-44A6-6484-E3C6-46197B7A7F68}"/>
-              </a:ext>
-            </a:extLst>
-          </p:cNvPr>
-          <p:cNvSpPr/>
-          <p:nvPr/>
-        </p:nvSpPr>
-        <p:spPr>
-          <a:xfrm rot="19500000">
-            <a:off x="6022428" y="1758459"/>
-            <a:ext cx="864000" cy="252000"/>
-          </a:xfrm>
-          <a:prstGeom prst="rightArrow">
-            <a:avLst>
-              <a:gd name="adj1" fmla="val 26963"/>
-              <a:gd name="adj2" fmla="val 50000"/>
-            </a:avLst>
-          </a:prstGeom>
-        </p:spPr>
-        <p:style>
-          <a:lnRef idx="2">
-            <a:schemeClr val="dk1">
-              <a:shade val="50000"/>
-            </a:schemeClr>
-          </a:lnRef>
-          <a:fillRef idx="1">
-            <a:schemeClr val="dk1"/>
-          </a:fillRef>
-          <a:effectRef idx="0">
-            <a:schemeClr val="dk1"/>
-          </a:effectRef>
-          <a:fontRef idx="minor">
-            <a:schemeClr val="lt1"/>
-          </a:fontRef>
-        </p:style>
-        <p:txBody>
-          <a:bodyPr rtlCol="0" anchor="ctr"/>
-          <a:lstStyle/>
-          <a:p>
-            <a:pPr algn="ctr"/>
-            <a:endParaRPr lang="nl-NL" dirty="0"/>
-          </a:p>
-        </p:txBody>
-      </p:sp>
-    </p:spTree>
-    <p:extLst>
-      <p:ext uri="{BB962C8B-B14F-4D97-AF65-F5344CB8AC3E}">
-        <p14:creationId xmlns:p14="http://schemas.microsoft.com/office/powerpoint/2010/main" val="3188284111"/>
-      </p:ext>
-    </p:extLst>
-  </p:cSld>
-  <p:clrMapOvr>
-    <a:masterClrMapping/>
-  </p:clrMapOvr>
-</p:sld>
-</file>
-
-<file path=ppt/slides/slide2.xml><?xml version="1.0" encoding="utf-8"?>
-<p:sld xmlns:a="http://schemas.openxmlformats.org/drawingml/2006/main" xmlns:r="http://schemas.openxmlformats.org/officeDocument/2006/relationships" xmlns:p="http://schemas.openxmlformats.org/presentationml/2006/main">
-  <p:cSld>
-    <p:spTree>
-      <p:nvGrpSpPr>
-        <p:cNvPr id="1" name=""/>
-        <p:cNvGrpSpPr/>
-        <p:nvPr/>
-      </p:nvGrpSpPr>
-      <p:grpSpPr>
-        <a:xfrm>
-          <a:off x="0" y="0"/>
-          <a:ext cx="0" cy="0"/>
-          <a:chOff x="0" y="0"/>
-          <a:chExt cx="0" cy="0"/>
-        </a:xfrm>
-      </p:grpSpPr>
-      <p:sp>
-        <p:nvSpPr>
           <p:cNvPr id="3" name="Rectangle 2">
             <a:extLst>
               <a:ext uri="{FF2B5EF4-FFF2-40B4-BE49-F238E27FC236}">
@@ -3648,7 +3254,7 @@
         </p:nvSpPr>
         <p:spPr>
           <a:xfrm>
-            <a:off x="3782470" y="279133"/>
+            <a:off x="3816434" y="283946"/>
             <a:ext cx="2387065" cy="2704699"/>
           </a:xfrm>
           <a:prstGeom prst="rect">
@@ -4108,6 +3714,400 @@
     <p:extLst>
       <p:ext uri="{BB962C8B-B14F-4D97-AF65-F5344CB8AC3E}">
         <p14:creationId xmlns:p14="http://schemas.microsoft.com/office/powerpoint/2010/main" val="4257385499"/>
+      </p:ext>
+    </p:extLst>
+  </p:cSld>
+  <p:clrMapOvr>
+    <a:masterClrMapping/>
+  </p:clrMapOvr>
+</p:sld>
+</file>
+
+<file path=ppt/slides/slide2.xml><?xml version="1.0" encoding="utf-8"?>
+<p:sld xmlns:a="http://schemas.openxmlformats.org/drawingml/2006/main" xmlns:r="http://schemas.openxmlformats.org/officeDocument/2006/relationships" xmlns:p="http://schemas.openxmlformats.org/presentationml/2006/main">
+  <p:cSld>
+    <p:spTree>
+      <p:nvGrpSpPr>
+        <p:cNvPr id="1" name=""/>
+        <p:cNvGrpSpPr/>
+        <p:nvPr/>
+      </p:nvGrpSpPr>
+      <p:grpSpPr>
+        <a:xfrm>
+          <a:off x="0" y="0"/>
+          <a:ext cx="0" cy="0"/>
+          <a:chOff x="0" y="0"/>
+          <a:chExt cx="0" cy="0"/>
+        </a:xfrm>
+      </p:grpSpPr>
+      <p:sp>
+        <p:nvSpPr>
+          <p:cNvPr id="7" name="TextBox 6">
+            <a:extLst>
+              <a:ext uri="{FF2B5EF4-FFF2-40B4-BE49-F238E27FC236}">
+                <a16:creationId xmlns:a16="http://schemas.microsoft.com/office/drawing/2014/main" id="{831BEC39-EFB7-F18A-9DFB-6BFD744ACE69}"/>
+              </a:ext>
+            </a:extLst>
+          </p:cNvPr>
+          <p:cNvSpPr txBox="1"/>
+          <p:nvPr/>
+        </p:nvSpPr>
+        <p:spPr>
+          <a:xfrm>
+            <a:off x="3923727" y="1778464"/>
+            <a:ext cx="2160000" cy="584775"/>
+          </a:xfrm>
+          <a:prstGeom prst="rect">
+            <a:avLst/>
+          </a:prstGeom>
+          <a:solidFill>
+            <a:schemeClr val="accent2">
+              <a:lumMod val="60000"/>
+              <a:lumOff val="40000"/>
+            </a:schemeClr>
+          </a:solidFill>
+        </p:spPr>
+        <p:txBody>
+          <a:bodyPr wrap="square" rtlCol="0">
+            <a:spAutoFit/>
+          </a:bodyPr>
+          <a:lstStyle/>
+          <a:p>
+            <a:pPr algn="ctr"/>
+            <a:r>
+              <a:rPr lang="en-US" sz="3200" dirty="0"/>
+              <a:t>Infected</a:t>
+            </a:r>
+            <a:endParaRPr lang="nl-NL" sz="3200" dirty="0"/>
+          </a:p>
+        </p:txBody>
+      </p:sp>
+      <p:sp>
+        <p:nvSpPr>
+          <p:cNvPr id="8" name="TextBox 7">
+            <a:extLst>
+              <a:ext uri="{FF2B5EF4-FFF2-40B4-BE49-F238E27FC236}">
+                <a16:creationId xmlns:a16="http://schemas.microsoft.com/office/drawing/2014/main" id="{5CD33D62-78AA-60FC-8767-F6816D1DB9EA}"/>
+              </a:ext>
+            </a:extLst>
+          </p:cNvPr>
+          <p:cNvSpPr txBox="1"/>
+          <p:nvPr/>
+        </p:nvSpPr>
+        <p:spPr>
+          <a:xfrm>
+            <a:off x="6810861" y="1246100"/>
+            <a:ext cx="2160000" cy="584775"/>
+          </a:xfrm>
+          <a:prstGeom prst="rect">
+            <a:avLst/>
+          </a:prstGeom>
+          <a:solidFill>
+            <a:schemeClr val="accent5">
+              <a:lumMod val="60000"/>
+              <a:lumOff val="40000"/>
+            </a:schemeClr>
+          </a:solidFill>
+        </p:spPr>
+        <p:txBody>
+          <a:bodyPr wrap="square" rtlCol="0">
+            <a:spAutoFit/>
+          </a:bodyPr>
+          <a:lstStyle/>
+          <a:p>
+            <a:pPr algn="ctr"/>
+            <a:r>
+              <a:rPr lang="en-US" sz="3200" dirty="0"/>
+              <a:t>Recovered</a:t>
+            </a:r>
+            <a:endParaRPr lang="nl-NL" sz="3200" dirty="0"/>
+          </a:p>
+        </p:txBody>
+      </p:sp>
+      <p:sp>
+        <p:nvSpPr>
+          <p:cNvPr id="2" name="TextBox 1">
+            <a:extLst>
+              <a:ext uri="{FF2B5EF4-FFF2-40B4-BE49-F238E27FC236}">
+                <a16:creationId xmlns:a16="http://schemas.microsoft.com/office/drawing/2014/main" id="{84049DDF-1B8C-90EE-6B57-F00E45097D9C}"/>
+              </a:ext>
+            </a:extLst>
+          </p:cNvPr>
+          <p:cNvSpPr txBox="1"/>
+          <p:nvPr/>
+        </p:nvSpPr>
+        <p:spPr>
+          <a:xfrm>
+            <a:off x="676593" y="1241074"/>
+            <a:ext cx="2520000" cy="584775"/>
+          </a:xfrm>
+          <a:prstGeom prst="rect">
+            <a:avLst/>
+          </a:prstGeom>
+          <a:solidFill>
+            <a:schemeClr val="accent4">
+              <a:lumMod val="40000"/>
+              <a:lumOff val="60000"/>
+            </a:schemeClr>
+          </a:solidFill>
+        </p:spPr>
+        <p:txBody>
+          <a:bodyPr wrap="square" rtlCol="0">
+            <a:spAutoFit/>
+          </a:bodyPr>
+          <a:lstStyle/>
+          <a:p>
+            <a:pPr algn="ctr"/>
+            <a:r>
+              <a:rPr lang="en-US" sz="3200" dirty="0"/>
+              <a:t>Susceptible</a:t>
+            </a:r>
+            <a:endParaRPr lang="nl-NL" sz="3200" dirty="0"/>
+          </a:p>
+        </p:txBody>
+      </p:sp>
+      <p:sp>
+        <p:nvSpPr>
+          <p:cNvPr id="16" name="Arrow: Right 15">
+            <a:extLst>
+              <a:ext uri="{FF2B5EF4-FFF2-40B4-BE49-F238E27FC236}">
+                <a16:creationId xmlns:a16="http://schemas.microsoft.com/office/drawing/2014/main" id="{3BCBB52A-0839-B95A-4F5C-4F16E2B3699B}"/>
+              </a:ext>
+            </a:extLst>
+          </p:cNvPr>
+          <p:cNvSpPr/>
+          <p:nvPr/>
+        </p:nvSpPr>
+        <p:spPr>
+          <a:xfrm rot="19500000">
+            <a:off x="3121027" y="1073641"/>
+            <a:ext cx="864000" cy="252000"/>
+          </a:xfrm>
+          <a:prstGeom prst="rightArrow">
+            <a:avLst>
+              <a:gd name="adj1" fmla="val 26963"/>
+              <a:gd name="adj2" fmla="val 50000"/>
+            </a:avLst>
+          </a:prstGeom>
+        </p:spPr>
+        <p:style>
+          <a:lnRef idx="2">
+            <a:schemeClr val="dk1">
+              <a:shade val="50000"/>
+            </a:schemeClr>
+          </a:lnRef>
+          <a:fillRef idx="1">
+            <a:schemeClr val="dk1"/>
+          </a:fillRef>
+          <a:effectRef idx="0">
+            <a:schemeClr val="dk1"/>
+          </a:effectRef>
+          <a:fontRef idx="minor">
+            <a:schemeClr val="lt1"/>
+          </a:fontRef>
+        </p:style>
+        <p:txBody>
+          <a:bodyPr rtlCol="0" anchor="ctr"/>
+          <a:lstStyle/>
+          <a:p>
+            <a:pPr algn="ctr"/>
+            <a:endParaRPr lang="nl-NL" dirty="0"/>
+          </a:p>
+        </p:txBody>
+      </p:sp>
+      <p:sp>
+        <p:nvSpPr>
+          <p:cNvPr id="18" name="Arrow: Right 17">
+            <a:extLst>
+              <a:ext uri="{FF2B5EF4-FFF2-40B4-BE49-F238E27FC236}">
+                <a16:creationId xmlns:a16="http://schemas.microsoft.com/office/drawing/2014/main" id="{619890EB-2F61-CC3F-D531-F271AC5C6DEE}"/>
+              </a:ext>
+            </a:extLst>
+          </p:cNvPr>
+          <p:cNvSpPr/>
+          <p:nvPr/>
+        </p:nvSpPr>
+        <p:spPr>
+          <a:xfrm rot="2100000" flipV="1">
+            <a:off x="3133510" y="1711077"/>
+            <a:ext cx="864000" cy="252000"/>
+          </a:xfrm>
+          <a:prstGeom prst="rightArrow">
+            <a:avLst>
+              <a:gd name="adj1" fmla="val 26963"/>
+              <a:gd name="adj2" fmla="val 50000"/>
+            </a:avLst>
+          </a:prstGeom>
+        </p:spPr>
+        <p:style>
+          <a:lnRef idx="2">
+            <a:schemeClr val="dk1">
+              <a:shade val="50000"/>
+            </a:schemeClr>
+          </a:lnRef>
+          <a:fillRef idx="1">
+            <a:schemeClr val="dk1"/>
+          </a:fillRef>
+          <a:effectRef idx="0">
+            <a:schemeClr val="dk1"/>
+          </a:effectRef>
+          <a:fontRef idx="minor">
+            <a:schemeClr val="lt1"/>
+          </a:fontRef>
+        </p:style>
+        <p:txBody>
+          <a:bodyPr rtlCol="0" anchor="ctr"/>
+          <a:lstStyle/>
+          <a:p>
+            <a:pPr algn="ctr"/>
+            <a:endParaRPr lang="nl-NL" dirty="0"/>
+          </a:p>
+        </p:txBody>
+      </p:sp>
+      <p:sp>
+        <p:nvSpPr>
+          <p:cNvPr id="4" name="TextBox 3">
+            <a:extLst>
+              <a:ext uri="{FF2B5EF4-FFF2-40B4-BE49-F238E27FC236}">
+                <a16:creationId xmlns:a16="http://schemas.microsoft.com/office/drawing/2014/main" id="{8657E4FA-809C-DD70-B2C2-7A29250E4FC7}"/>
+              </a:ext>
+            </a:extLst>
+          </p:cNvPr>
+          <p:cNvSpPr txBox="1"/>
+          <p:nvPr/>
+        </p:nvSpPr>
+        <p:spPr>
+          <a:xfrm>
+            <a:off x="3923727" y="656299"/>
+            <a:ext cx="2160000" cy="584775"/>
+          </a:xfrm>
+          <a:prstGeom prst="rect">
+            <a:avLst/>
+          </a:prstGeom>
+          <a:solidFill>
+            <a:schemeClr val="accent2">
+              <a:lumMod val="60000"/>
+              <a:lumOff val="40000"/>
+            </a:schemeClr>
+          </a:solidFill>
+        </p:spPr>
+        <p:txBody>
+          <a:bodyPr wrap="square" rtlCol="0">
+            <a:spAutoFit/>
+          </a:bodyPr>
+          <a:lstStyle/>
+          <a:p>
+            <a:pPr algn="ctr"/>
+            <a:r>
+              <a:rPr lang="en-US" sz="3200" dirty="0"/>
+              <a:t>Carrier</a:t>
+            </a:r>
+            <a:endParaRPr lang="nl-NL" sz="3200" dirty="0"/>
+          </a:p>
+        </p:txBody>
+      </p:sp>
+      <p:sp>
+        <p:nvSpPr>
+          <p:cNvPr id="15" name="Arrow: Right 14">
+            <a:extLst>
+              <a:ext uri="{FF2B5EF4-FFF2-40B4-BE49-F238E27FC236}">
+                <a16:creationId xmlns:a16="http://schemas.microsoft.com/office/drawing/2014/main" id="{A25E6295-2E58-04E7-07F7-64345810DA1B}"/>
+              </a:ext>
+            </a:extLst>
+          </p:cNvPr>
+          <p:cNvSpPr/>
+          <p:nvPr/>
+        </p:nvSpPr>
+        <p:spPr>
+          <a:xfrm rot="2100000" flipV="1">
+            <a:off x="6022425" y="1058976"/>
+            <a:ext cx="864000" cy="252000"/>
+          </a:xfrm>
+          <a:prstGeom prst="rightArrow">
+            <a:avLst>
+              <a:gd name="adj1" fmla="val 26963"/>
+              <a:gd name="adj2" fmla="val 50000"/>
+            </a:avLst>
+          </a:prstGeom>
+        </p:spPr>
+        <p:style>
+          <a:lnRef idx="2">
+            <a:schemeClr val="dk1">
+              <a:shade val="50000"/>
+            </a:schemeClr>
+          </a:lnRef>
+          <a:fillRef idx="1">
+            <a:schemeClr val="dk1"/>
+          </a:fillRef>
+          <a:effectRef idx="0">
+            <a:schemeClr val="dk1"/>
+          </a:effectRef>
+          <a:fontRef idx="minor">
+            <a:schemeClr val="lt1"/>
+          </a:fontRef>
+        </p:style>
+        <p:txBody>
+          <a:bodyPr rtlCol="0" anchor="ctr"/>
+          <a:lstStyle/>
+          <a:p>
+            <a:pPr algn="ctr"/>
+            <a:endParaRPr lang="nl-NL" dirty="0"/>
+          </a:p>
+        </p:txBody>
+      </p:sp>
+      <p:sp>
+        <p:nvSpPr>
+          <p:cNvPr id="17" name="Arrow: Right 16">
+            <a:extLst>
+              <a:ext uri="{FF2B5EF4-FFF2-40B4-BE49-F238E27FC236}">
+                <a16:creationId xmlns:a16="http://schemas.microsoft.com/office/drawing/2014/main" id="{ECBAAB4E-44A6-6484-E3C6-46197B7A7F68}"/>
+              </a:ext>
+            </a:extLst>
+          </p:cNvPr>
+          <p:cNvSpPr/>
+          <p:nvPr/>
+        </p:nvSpPr>
+        <p:spPr>
+          <a:xfrm rot="19500000">
+            <a:off x="6022428" y="1758459"/>
+            <a:ext cx="864000" cy="252000"/>
+          </a:xfrm>
+          <a:prstGeom prst="rightArrow">
+            <a:avLst>
+              <a:gd name="adj1" fmla="val 26963"/>
+              <a:gd name="adj2" fmla="val 50000"/>
+            </a:avLst>
+          </a:prstGeom>
+        </p:spPr>
+        <p:style>
+          <a:lnRef idx="2">
+            <a:schemeClr val="dk1">
+              <a:shade val="50000"/>
+            </a:schemeClr>
+          </a:lnRef>
+          <a:fillRef idx="1">
+            <a:schemeClr val="dk1"/>
+          </a:fillRef>
+          <a:effectRef idx="0">
+            <a:schemeClr val="dk1"/>
+          </a:effectRef>
+          <a:fontRef idx="minor">
+            <a:schemeClr val="lt1"/>
+          </a:fontRef>
+        </p:style>
+        <p:txBody>
+          <a:bodyPr rtlCol="0" anchor="ctr"/>
+          <a:lstStyle/>
+          <a:p>
+            <a:pPr algn="ctr"/>
+            <a:endParaRPr lang="nl-NL" dirty="0"/>
+          </a:p>
+        </p:txBody>
+      </p:sp>
+    </p:spTree>
+    <p:extLst>
+      <p:ext uri="{BB962C8B-B14F-4D97-AF65-F5344CB8AC3E}">
+        <p14:creationId xmlns:p14="http://schemas.microsoft.com/office/powerpoint/2010/main" val="3188284111"/>
       </p:ext>
     </p:extLst>
   </p:cSld>

</xml_diff>